<commit_message>
updated project with crime data analysis
</commit_message>
<xml_diff>
--- a/Plots.pptx
+++ b/Plots.pptx
@@ -10,6 +10,10 @@
     <p:sldId id="258" r:id="rId4"/>
     <p:sldId id="260" r:id="rId5"/>
     <p:sldId id="261" r:id="rId6"/>
+    <p:sldId id="265" r:id="rId7"/>
+    <p:sldId id="262" r:id="rId8"/>
+    <p:sldId id="263" r:id="rId9"/>
+    <p:sldId id="264" r:id="rId10"/>
   </p:sldIdLst>
   <p:sldSz cx="12192000" cy="6858000"/>
   <p:notesSz cx="6858000" cy="9144000"/>
@@ -245,7 +249,7 @@
           <a:p>
             <a:fld id="{17F697A0-7659-4FAB-8542-57EDC834B0B0}" type="datetimeFigureOut">
               <a:rPr lang="en-US" smtClean="0"/>
-              <a:t>12/20/2016</a:t>
+              <a:t>12/29/2016</a:t>
             </a:fld>
             <a:endParaRPr lang="en-US"/>
           </a:p>
@@ -413,7 +417,7 @@
           <a:p>
             <a:fld id="{17F697A0-7659-4FAB-8542-57EDC834B0B0}" type="datetimeFigureOut">
               <a:rPr lang="en-US" smtClean="0"/>
-              <a:t>12/20/2016</a:t>
+              <a:t>12/29/2016</a:t>
             </a:fld>
             <a:endParaRPr lang="en-US"/>
           </a:p>
@@ -591,7 +595,7 @@
           <a:p>
             <a:fld id="{17F697A0-7659-4FAB-8542-57EDC834B0B0}" type="datetimeFigureOut">
               <a:rPr lang="en-US" smtClean="0"/>
-              <a:t>12/20/2016</a:t>
+              <a:t>12/29/2016</a:t>
             </a:fld>
             <a:endParaRPr lang="en-US"/>
           </a:p>
@@ -759,7 +763,7 @@
           <a:p>
             <a:fld id="{17F697A0-7659-4FAB-8542-57EDC834B0B0}" type="datetimeFigureOut">
               <a:rPr lang="en-US" smtClean="0"/>
-              <a:t>12/20/2016</a:t>
+              <a:t>12/29/2016</a:t>
             </a:fld>
             <a:endParaRPr lang="en-US"/>
           </a:p>
@@ -1004,7 +1008,7 @@
           <a:p>
             <a:fld id="{17F697A0-7659-4FAB-8542-57EDC834B0B0}" type="datetimeFigureOut">
               <a:rPr lang="en-US" smtClean="0"/>
-              <a:t>12/20/2016</a:t>
+              <a:t>12/29/2016</a:t>
             </a:fld>
             <a:endParaRPr lang="en-US"/>
           </a:p>
@@ -1233,7 +1237,7 @@
           <a:p>
             <a:fld id="{17F697A0-7659-4FAB-8542-57EDC834B0B0}" type="datetimeFigureOut">
               <a:rPr lang="en-US" smtClean="0"/>
-              <a:t>12/20/2016</a:t>
+              <a:t>12/29/2016</a:t>
             </a:fld>
             <a:endParaRPr lang="en-US"/>
           </a:p>
@@ -1597,7 +1601,7 @@
           <a:p>
             <a:fld id="{17F697A0-7659-4FAB-8542-57EDC834B0B0}" type="datetimeFigureOut">
               <a:rPr lang="en-US" smtClean="0"/>
-              <a:t>12/20/2016</a:t>
+              <a:t>12/29/2016</a:t>
             </a:fld>
             <a:endParaRPr lang="en-US"/>
           </a:p>
@@ -1714,7 +1718,7 @@
           <a:p>
             <a:fld id="{17F697A0-7659-4FAB-8542-57EDC834B0B0}" type="datetimeFigureOut">
               <a:rPr lang="en-US" smtClean="0"/>
-              <a:t>12/20/2016</a:t>
+              <a:t>12/29/2016</a:t>
             </a:fld>
             <a:endParaRPr lang="en-US"/>
           </a:p>
@@ -1809,7 +1813,7 @@
           <a:p>
             <a:fld id="{17F697A0-7659-4FAB-8542-57EDC834B0B0}" type="datetimeFigureOut">
               <a:rPr lang="en-US" smtClean="0"/>
-              <a:t>12/20/2016</a:t>
+              <a:t>12/29/2016</a:t>
             </a:fld>
             <a:endParaRPr lang="en-US"/>
           </a:p>
@@ -2084,7 +2088,7 @@
           <a:p>
             <a:fld id="{17F697A0-7659-4FAB-8542-57EDC834B0B0}" type="datetimeFigureOut">
               <a:rPr lang="en-US" smtClean="0"/>
-              <a:t>12/20/2016</a:t>
+              <a:t>12/29/2016</a:t>
             </a:fld>
             <a:endParaRPr lang="en-US"/>
           </a:p>
@@ -2336,7 +2340,7 @@
           <a:p>
             <a:fld id="{17F697A0-7659-4FAB-8542-57EDC834B0B0}" type="datetimeFigureOut">
               <a:rPr lang="en-US" smtClean="0"/>
-              <a:t>12/20/2016</a:t>
+              <a:t>12/29/2016</a:t>
             </a:fld>
             <a:endParaRPr lang="en-US"/>
           </a:p>
@@ -2553,7 +2557,7 @@
           <a:p>
             <a:fld id="{17F697A0-7659-4FAB-8542-57EDC834B0B0}" type="datetimeFigureOut">
               <a:rPr lang="en-US" smtClean="0"/>
-              <a:t>12/20/2016</a:t>
+              <a:t>12/29/2016</a:t>
             </a:fld>
             <a:endParaRPr lang="en-US"/>
           </a:p>
@@ -3003,7 +3007,7 @@
         </p:spPr>
         <p:txBody>
           <a:bodyPr>
-            <a:normAutofit fontScale="92500" lnSpcReduction="10000"/>
+            <a:normAutofit fontScale="92500" lnSpcReduction="20000"/>
           </a:bodyPr>
           <a:lstStyle/>
           <a:p>
@@ -3013,6 +3017,12 @@
             <a:r>
               <a:rPr lang="en-US" dirty="0"/>
               <a:t>United States National Occupational Employment and Wage Estimates (May 2015)</a:t>
+            </a:r>
+          </a:p>
+          <a:p>
+            <a:r>
+              <a:rPr lang="en-US" dirty="0"/>
+              <a:t>United States Crime Rate 2015</a:t>
             </a:r>
             <a:br>
               <a:rPr lang="en-US" dirty="0"/>
@@ -3022,7 +3032,15 @@
             </a:br>
             <a:r>
               <a:rPr lang="en-US" dirty="0"/>
-              <a:t>Data Source: Bureau Of Labor Statistics</a:t>
+              <a:t>Data Source: Bureau Of Labor Statistics, Federal </a:t>
+            </a:r>
+            <a:r>
+              <a:rPr lang="en-US" dirty="0"/>
+              <a:t>Bureau</a:t>
+            </a:r>
+            <a:r>
+              <a:rPr lang="en-US" dirty="0"/>
+              <a:t> of Investigation</a:t>
             </a:r>
           </a:p>
           <a:p>
@@ -3283,6 +3301,222 @@
     <p:extLst>
       <p:ext uri="{BB962C8B-B14F-4D97-AF65-F5344CB8AC3E}">
         <p14:creationId xmlns:p14="http://schemas.microsoft.com/office/powerpoint/2010/main" val="1081628903"/>
+      </p:ext>
+    </p:extLst>
+  </p:cSld>
+  <p:clrMapOvr>
+    <a:masterClrMapping/>
+  </p:clrMapOvr>
+</p:sld>
+</file>
+
+<file path=ppt/slides/slide6.xml><?xml version="1.0" encoding="utf-8"?>
+<p:sld xmlns:a="http://schemas.openxmlformats.org/drawingml/2006/main" xmlns:r="http://schemas.openxmlformats.org/officeDocument/2006/relationships" xmlns:p="http://schemas.openxmlformats.org/presentationml/2006/main">
+  <p:cSld>
+    <p:spTree>
+      <p:nvGrpSpPr>
+        <p:cNvPr id="1" name=""/>
+        <p:cNvGrpSpPr/>
+        <p:nvPr/>
+      </p:nvGrpSpPr>
+      <p:grpSpPr>
+        <a:xfrm>
+          <a:off x="0" y="0"/>
+          <a:ext cx="0" cy="0"/>
+          <a:chOff x="0" y="0"/>
+          <a:chExt cx="0" cy="0"/>
+        </a:xfrm>
+      </p:grpSpPr>
+      <p:pic>
+        <p:nvPicPr>
+          <p:cNvPr id="2" name="Picture 1"/>
+          <p:cNvPicPr>
+            <a:picLocks noChangeAspect="1"/>
+          </p:cNvPicPr>
+          <p:nvPr/>
+        </p:nvPicPr>
+        <p:blipFill>
+          <a:blip r:embed="rId2"/>
+          <a:stretch>
+            <a:fillRect/>
+          </a:stretch>
+        </p:blipFill>
+        <p:spPr>
+          <a:xfrm>
+            <a:off x="0" y="0"/>
+            <a:ext cx="12192000" cy="6858000"/>
+          </a:xfrm>
+          <a:prstGeom prst="rect">
+            <a:avLst/>
+          </a:prstGeom>
+        </p:spPr>
+      </p:pic>
+    </p:spTree>
+    <p:extLst>
+      <p:ext uri="{BB962C8B-B14F-4D97-AF65-F5344CB8AC3E}">
+        <p14:creationId xmlns:p14="http://schemas.microsoft.com/office/powerpoint/2010/main" val="4117608636"/>
+      </p:ext>
+    </p:extLst>
+  </p:cSld>
+  <p:clrMapOvr>
+    <a:masterClrMapping/>
+  </p:clrMapOvr>
+</p:sld>
+</file>
+
+<file path=ppt/slides/slide7.xml><?xml version="1.0" encoding="utf-8"?>
+<p:sld xmlns:a="http://schemas.openxmlformats.org/drawingml/2006/main" xmlns:r="http://schemas.openxmlformats.org/officeDocument/2006/relationships" xmlns:p="http://schemas.openxmlformats.org/presentationml/2006/main">
+  <p:cSld>
+    <p:spTree>
+      <p:nvGrpSpPr>
+        <p:cNvPr id="1" name=""/>
+        <p:cNvGrpSpPr/>
+        <p:nvPr/>
+      </p:nvGrpSpPr>
+      <p:grpSpPr>
+        <a:xfrm>
+          <a:off x="0" y="0"/>
+          <a:ext cx="0" cy="0"/>
+          <a:chOff x="0" y="0"/>
+          <a:chExt cx="0" cy="0"/>
+        </a:xfrm>
+      </p:grpSpPr>
+      <p:pic>
+        <p:nvPicPr>
+          <p:cNvPr id="3" name="Picture 2"/>
+          <p:cNvPicPr>
+            <a:picLocks noChangeAspect="1"/>
+          </p:cNvPicPr>
+          <p:nvPr/>
+        </p:nvPicPr>
+        <p:blipFill>
+          <a:blip r:embed="rId2"/>
+          <a:stretch>
+            <a:fillRect/>
+          </a:stretch>
+        </p:blipFill>
+        <p:spPr>
+          <a:xfrm>
+            <a:off x="0" y="0"/>
+            <a:ext cx="12192000" cy="6858000"/>
+          </a:xfrm>
+          <a:prstGeom prst="rect">
+            <a:avLst/>
+          </a:prstGeom>
+        </p:spPr>
+      </p:pic>
+    </p:spTree>
+    <p:extLst>
+      <p:ext uri="{BB962C8B-B14F-4D97-AF65-F5344CB8AC3E}">
+        <p14:creationId xmlns:p14="http://schemas.microsoft.com/office/powerpoint/2010/main" val="95910105"/>
+      </p:ext>
+    </p:extLst>
+  </p:cSld>
+  <p:clrMapOvr>
+    <a:masterClrMapping/>
+  </p:clrMapOvr>
+</p:sld>
+</file>
+
+<file path=ppt/slides/slide8.xml><?xml version="1.0" encoding="utf-8"?>
+<p:sld xmlns:a="http://schemas.openxmlformats.org/drawingml/2006/main" xmlns:r="http://schemas.openxmlformats.org/officeDocument/2006/relationships" xmlns:p="http://schemas.openxmlformats.org/presentationml/2006/main">
+  <p:cSld>
+    <p:spTree>
+      <p:nvGrpSpPr>
+        <p:cNvPr id="1" name=""/>
+        <p:cNvGrpSpPr/>
+        <p:nvPr/>
+      </p:nvGrpSpPr>
+      <p:grpSpPr>
+        <a:xfrm>
+          <a:off x="0" y="0"/>
+          <a:ext cx="0" cy="0"/>
+          <a:chOff x="0" y="0"/>
+          <a:chExt cx="0" cy="0"/>
+        </a:xfrm>
+      </p:grpSpPr>
+      <p:pic>
+        <p:nvPicPr>
+          <p:cNvPr id="2" name="Picture 1"/>
+          <p:cNvPicPr>
+            <a:picLocks noChangeAspect="1"/>
+          </p:cNvPicPr>
+          <p:nvPr/>
+        </p:nvPicPr>
+        <p:blipFill>
+          <a:blip r:embed="rId2"/>
+          <a:stretch>
+            <a:fillRect/>
+          </a:stretch>
+        </p:blipFill>
+        <p:spPr>
+          <a:xfrm>
+            <a:off x="0" y="0"/>
+            <a:ext cx="12192000" cy="6858000"/>
+          </a:xfrm>
+          <a:prstGeom prst="rect">
+            <a:avLst/>
+          </a:prstGeom>
+        </p:spPr>
+      </p:pic>
+    </p:spTree>
+    <p:extLst>
+      <p:ext uri="{BB962C8B-B14F-4D97-AF65-F5344CB8AC3E}">
+        <p14:creationId xmlns:p14="http://schemas.microsoft.com/office/powerpoint/2010/main" val="1501216490"/>
+      </p:ext>
+    </p:extLst>
+  </p:cSld>
+  <p:clrMapOvr>
+    <a:masterClrMapping/>
+  </p:clrMapOvr>
+</p:sld>
+</file>
+
+<file path=ppt/slides/slide9.xml><?xml version="1.0" encoding="utf-8"?>
+<p:sld xmlns:a="http://schemas.openxmlformats.org/drawingml/2006/main" xmlns:r="http://schemas.openxmlformats.org/officeDocument/2006/relationships" xmlns:p="http://schemas.openxmlformats.org/presentationml/2006/main">
+  <p:cSld>
+    <p:spTree>
+      <p:nvGrpSpPr>
+        <p:cNvPr id="1" name=""/>
+        <p:cNvGrpSpPr/>
+        <p:nvPr/>
+      </p:nvGrpSpPr>
+      <p:grpSpPr>
+        <a:xfrm>
+          <a:off x="0" y="0"/>
+          <a:ext cx="0" cy="0"/>
+          <a:chOff x="0" y="0"/>
+          <a:chExt cx="0" cy="0"/>
+        </a:xfrm>
+      </p:grpSpPr>
+      <p:pic>
+        <p:nvPicPr>
+          <p:cNvPr id="2" name="Picture 1"/>
+          <p:cNvPicPr>
+            <a:picLocks noChangeAspect="1"/>
+          </p:cNvPicPr>
+          <p:nvPr/>
+        </p:nvPicPr>
+        <p:blipFill>
+          <a:blip r:embed="rId2"/>
+          <a:stretch>
+            <a:fillRect/>
+          </a:stretch>
+        </p:blipFill>
+        <p:spPr>
+          <a:xfrm>
+            <a:off x="0" y="0"/>
+            <a:ext cx="12192000" cy="6858000"/>
+          </a:xfrm>
+          <a:prstGeom prst="rect">
+            <a:avLst/>
+          </a:prstGeom>
+        </p:spPr>
+      </p:pic>
+    </p:spTree>
+    <p:extLst>
+      <p:ext uri="{BB962C8B-B14F-4D97-AF65-F5344CB8AC3E}">
+        <p14:creationId xmlns:p14="http://schemas.microsoft.com/office/powerpoint/2010/main" val="2584874860"/>
       </p:ext>
     </p:extLst>
   </p:cSld>

</xml_diff>

<commit_message>
Updated crime data analysis
</commit_message>
<xml_diff>
--- a/Plots.pptx
+++ b/Plots.pptx
@@ -9,11 +9,13 @@
     <p:sldId id="257" r:id="rId3"/>
     <p:sldId id="258" r:id="rId4"/>
     <p:sldId id="260" r:id="rId5"/>
-    <p:sldId id="261" r:id="rId6"/>
-    <p:sldId id="265" r:id="rId7"/>
-    <p:sldId id="262" r:id="rId8"/>
-    <p:sldId id="263" r:id="rId9"/>
-    <p:sldId id="264" r:id="rId10"/>
+    <p:sldId id="267" r:id="rId6"/>
+    <p:sldId id="268" r:id="rId7"/>
+    <p:sldId id="261" r:id="rId8"/>
+    <p:sldId id="265" r:id="rId9"/>
+    <p:sldId id="262" r:id="rId10"/>
+    <p:sldId id="263" r:id="rId11"/>
+    <p:sldId id="264" r:id="rId12"/>
   </p:sldIdLst>
   <p:sldSz cx="12192000" cy="6858000"/>
   <p:notesSz cx="6858000" cy="9144000"/>
@@ -3032,15 +3034,7 @@
             </a:br>
             <a:r>
               <a:rPr lang="en-US" dirty="0"/>
-              <a:t>Data Source: Bureau Of Labor Statistics, Federal </a:t>
-            </a:r>
-            <a:r>
-              <a:rPr lang="en-US" dirty="0"/>
-              <a:t>Bureau</a:t>
-            </a:r>
-            <a:r>
-              <a:rPr lang="en-US" dirty="0"/>
-              <a:t> of Investigation</a:t>
+              <a:t>Data Source: Bureau Of Labor Statistics, Federal Bureau of Investigation</a:t>
             </a:r>
           </a:p>
           <a:p>
@@ -3085,6 +3079,114 @@
     <p:extLst>
       <p:ext uri="{BB962C8B-B14F-4D97-AF65-F5344CB8AC3E}">
         <p14:creationId xmlns:p14="http://schemas.microsoft.com/office/powerpoint/2010/main" val="3591566387"/>
+      </p:ext>
+    </p:extLst>
+  </p:cSld>
+  <p:clrMapOvr>
+    <a:masterClrMapping/>
+  </p:clrMapOvr>
+</p:sld>
+</file>
+
+<file path=ppt/slides/slide10.xml><?xml version="1.0" encoding="utf-8"?>
+<p:sld xmlns:a="http://schemas.openxmlformats.org/drawingml/2006/main" xmlns:r="http://schemas.openxmlformats.org/officeDocument/2006/relationships" xmlns:p="http://schemas.openxmlformats.org/presentationml/2006/main">
+  <p:cSld>
+    <p:spTree>
+      <p:nvGrpSpPr>
+        <p:cNvPr id="1" name=""/>
+        <p:cNvGrpSpPr/>
+        <p:nvPr/>
+      </p:nvGrpSpPr>
+      <p:grpSpPr>
+        <a:xfrm>
+          <a:off x="0" y="0"/>
+          <a:ext cx="0" cy="0"/>
+          <a:chOff x="0" y="0"/>
+          <a:chExt cx="0" cy="0"/>
+        </a:xfrm>
+      </p:grpSpPr>
+      <p:pic>
+        <p:nvPicPr>
+          <p:cNvPr id="2" name="Picture 1"/>
+          <p:cNvPicPr>
+            <a:picLocks noChangeAspect="1"/>
+          </p:cNvPicPr>
+          <p:nvPr/>
+        </p:nvPicPr>
+        <p:blipFill>
+          <a:blip r:embed="rId2"/>
+          <a:stretch>
+            <a:fillRect/>
+          </a:stretch>
+        </p:blipFill>
+        <p:spPr>
+          <a:xfrm>
+            <a:off x="0" y="0"/>
+            <a:ext cx="12192000" cy="6858000"/>
+          </a:xfrm>
+          <a:prstGeom prst="rect">
+            <a:avLst/>
+          </a:prstGeom>
+        </p:spPr>
+      </p:pic>
+    </p:spTree>
+    <p:extLst>
+      <p:ext uri="{BB962C8B-B14F-4D97-AF65-F5344CB8AC3E}">
+        <p14:creationId xmlns:p14="http://schemas.microsoft.com/office/powerpoint/2010/main" val="1501216490"/>
+      </p:ext>
+    </p:extLst>
+  </p:cSld>
+  <p:clrMapOvr>
+    <a:masterClrMapping/>
+  </p:clrMapOvr>
+</p:sld>
+</file>
+
+<file path=ppt/slides/slide11.xml><?xml version="1.0" encoding="utf-8"?>
+<p:sld xmlns:a="http://schemas.openxmlformats.org/drawingml/2006/main" xmlns:r="http://schemas.openxmlformats.org/officeDocument/2006/relationships" xmlns:p="http://schemas.openxmlformats.org/presentationml/2006/main">
+  <p:cSld>
+    <p:spTree>
+      <p:nvGrpSpPr>
+        <p:cNvPr id="1" name=""/>
+        <p:cNvGrpSpPr/>
+        <p:nvPr/>
+      </p:nvGrpSpPr>
+      <p:grpSpPr>
+        <a:xfrm>
+          <a:off x="0" y="0"/>
+          <a:ext cx="0" cy="0"/>
+          <a:chOff x="0" y="0"/>
+          <a:chExt cx="0" cy="0"/>
+        </a:xfrm>
+      </p:grpSpPr>
+      <p:pic>
+        <p:nvPicPr>
+          <p:cNvPr id="2" name="Picture 1"/>
+          <p:cNvPicPr>
+            <a:picLocks noChangeAspect="1"/>
+          </p:cNvPicPr>
+          <p:nvPr/>
+        </p:nvPicPr>
+        <p:blipFill>
+          <a:blip r:embed="rId2"/>
+          <a:stretch>
+            <a:fillRect/>
+          </a:stretch>
+        </p:blipFill>
+        <p:spPr>
+          <a:xfrm>
+            <a:off x="0" y="0"/>
+            <a:ext cx="12192000" cy="6858000"/>
+          </a:xfrm>
+          <a:prstGeom prst="rect">
+            <a:avLst/>
+          </a:prstGeom>
+        </p:spPr>
+      </p:pic>
+    </p:spTree>
+    <p:extLst>
+      <p:ext uri="{BB962C8B-B14F-4D97-AF65-F5344CB8AC3E}">
+        <p14:creationId xmlns:p14="http://schemas.microsoft.com/office/powerpoint/2010/main" val="2584874860"/>
       </p:ext>
     </p:extLst>
   </p:cSld>
@@ -3300,7 +3402,7 @@
     </p:spTree>
     <p:extLst>
       <p:ext uri="{BB962C8B-B14F-4D97-AF65-F5344CB8AC3E}">
-        <p14:creationId xmlns:p14="http://schemas.microsoft.com/office/powerpoint/2010/main" val="1081628903"/>
+        <p14:creationId xmlns:p14="http://schemas.microsoft.com/office/powerpoint/2010/main" val="660433539"/>
       </p:ext>
     </p:extLst>
   </p:cSld>
@@ -3354,7 +3456,7 @@
     </p:spTree>
     <p:extLst>
       <p:ext uri="{BB962C8B-B14F-4D97-AF65-F5344CB8AC3E}">
-        <p14:creationId xmlns:p14="http://schemas.microsoft.com/office/powerpoint/2010/main" val="4117608636"/>
+        <p14:creationId xmlns:p14="http://schemas.microsoft.com/office/powerpoint/2010/main" val="1207591607"/>
       </p:ext>
     </p:extLst>
   </p:cSld>
@@ -3383,7 +3485,7 @@
       </p:grpSpPr>
       <p:pic>
         <p:nvPicPr>
-          <p:cNvPr id="3" name="Picture 2"/>
+          <p:cNvPr id="2" name="Picture 1"/>
           <p:cNvPicPr>
             <a:picLocks noChangeAspect="1"/>
           </p:cNvPicPr>
@@ -3408,7 +3510,7 @@
     </p:spTree>
     <p:extLst>
       <p:ext uri="{BB962C8B-B14F-4D97-AF65-F5344CB8AC3E}">
-        <p14:creationId xmlns:p14="http://schemas.microsoft.com/office/powerpoint/2010/main" val="95910105"/>
+        <p14:creationId xmlns:p14="http://schemas.microsoft.com/office/powerpoint/2010/main" val="1081628903"/>
       </p:ext>
     </p:extLst>
   </p:cSld>
@@ -3462,7 +3564,7 @@
     </p:spTree>
     <p:extLst>
       <p:ext uri="{BB962C8B-B14F-4D97-AF65-F5344CB8AC3E}">
-        <p14:creationId xmlns:p14="http://schemas.microsoft.com/office/powerpoint/2010/main" val="1501216490"/>
+        <p14:creationId xmlns:p14="http://schemas.microsoft.com/office/powerpoint/2010/main" val="4117608636"/>
       </p:ext>
     </p:extLst>
   </p:cSld>
@@ -3491,7 +3593,7 @@
       </p:grpSpPr>
       <p:pic>
         <p:nvPicPr>
-          <p:cNvPr id="2" name="Picture 1"/>
+          <p:cNvPr id="3" name="Picture 2"/>
           <p:cNvPicPr>
             <a:picLocks noChangeAspect="1"/>
           </p:cNvPicPr>
@@ -3516,7 +3618,7 @@
     </p:spTree>
     <p:extLst>
       <p:ext uri="{BB962C8B-B14F-4D97-AF65-F5344CB8AC3E}">
-        <p14:creationId xmlns:p14="http://schemas.microsoft.com/office/powerpoint/2010/main" val="2584874860"/>
+        <p14:creationId xmlns:p14="http://schemas.microsoft.com/office/powerpoint/2010/main" val="95910105"/>
       </p:ext>
     </p:extLst>
   </p:cSld>

</xml_diff>